<commit_message>
Lade till produkter som ska säljas till mockupen
</commit_message>
<xml_diff>
--- a/slutprojekt/skisser och mockups/Mockup.pptx
+++ b/slutprojekt/skisser och mockups/Mockup.pptx
@@ -197,7 +197,7 @@
           <a:p>
             <a:fld id="{213C7537-D60D-4687-B9D2-5686070236B7}" type="datetimeFigureOut">
               <a:rPr lang="sv-SE" smtClean="0"/>
-              <a:t>2016-03-16</a:t>
+              <a:t>2016-03-23</a:t>
             </a:fld>
             <a:endParaRPr lang="sv-SE"/>
           </a:p>
@@ -680,7 +680,7 @@
           <a:p>
             <a:fld id="{0CDC862D-4A36-4110-A1D8-F0241D631B55}" type="datetimeFigureOut">
               <a:rPr lang="sv-SE" smtClean="0"/>
-              <a:t>2016-03-16</a:t>
+              <a:t>2016-03-23</a:t>
             </a:fld>
             <a:endParaRPr lang="sv-SE"/>
           </a:p>
@@ -850,7 +850,7 @@
           <a:p>
             <a:fld id="{0CDC862D-4A36-4110-A1D8-F0241D631B55}" type="datetimeFigureOut">
               <a:rPr lang="sv-SE" smtClean="0"/>
-              <a:t>2016-03-16</a:t>
+              <a:t>2016-03-23</a:t>
             </a:fld>
             <a:endParaRPr lang="sv-SE"/>
           </a:p>
@@ -1030,7 +1030,7 @@
           <a:p>
             <a:fld id="{0CDC862D-4A36-4110-A1D8-F0241D631B55}" type="datetimeFigureOut">
               <a:rPr lang="sv-SE" smtClean="0"/>
-              <a:t>2016-03-16</a:t>
+              <a:t>2016-03-23</a:t>
             </a:fld>
             <a:endParaRPr lang="sv-SE"/>
           </a:p>
@@ -1200,7 +1200,7 @@
           <a:p>
             <a:fld id="{0CDC862D-4A36-4110-A1D8-F0241D631B55}" type="datetimeFigureOut">
               <a:rPr lang="sv-SE" smtClean="0"/>
-              <a:t>2016-03-16</a:t>
+              <a:t>2016-03-23</a:t>
             </a:fld>
             <a:endParaRPr lang="sv-SE"/>
           </a:p>
@@ -1446,7 +1446,7 @@
           <a:p>
             <a:fld id="{0CDC862D-4A36-4110-A1D8-F0241D631B55}" type="datetimeFigureOut">
               <a:rPr lang="sv-SE" smtClean="0"/>
-              <a:t>2016-03-16</a:t>
+              <a:t>2016-03-23</a:t>
             </a:fld>
             <a:endParaRPr lang="sv-SE"/>
           </a:p>
@@ -1678,7 +1678,7 @@
           <a:p>
             <a:fld id="{0CDC862D-4A36-4110-A1D8-F0241D631B55}" type="datetimeFigureOut">
               <a:rPr lang="sv-SE" smtClean="0"/>
-              <a:t>2016-03-16</a:t>
+              <a:t>2016-03-23</a:t>
             </a:fld>
             <a:endParaRPr lang="sv-SE"/>
           </a:p>
@@ -2045,7 +2045,7 @@
           <a:p>
             <a:fld id="{0CDC862D-4A36-4110-A1D8-F0241D631B55}" type="datetimeFigureOut">
               <a:rPr lang="sv-SE" smtClean="0"/>
-              <a:t>2016-03-16</a:t>
+              <a:t>2016-03-23</a:t>
             </a:fld>
             <a:endParaRPr lang="sv-SE"/>
           </a:p>
@@ -2163,7 +2163,7 @@
           <a:p>
             <a:fld id="{0CDC862D-4A36-4110-A1D8-F0241D631B55}" type="datetimeFigureOut">
               <a:rPr lang="sv-SE" smtClean="0"/>
-              <a:t>2016-03-16</a:t>
+              <a:t>2016-03-23</a:t>
             </a:fld>
             <a:endParaRPr lang="sv-SE"/>
           </a:p>
@@ -2258,7 +2258,7 @@
           <a:p>
             <a:fld id="{0CDC862D-4A36-4110-A1D8-F0241D631B55}" type="datetimeFigureOut">
               <a:rPr lang="sv-SE" smtClean="0"/>
-              <a:t>2016-03-16</a:t>
+              <a:t>2016-03-23</a:t>
             </a:fld>
             <a:endParaRPr lang="sv-SE"/>
           </a:p>
@@ -2535,7 +2535,7 @@
           <a:p>
             <a:fld id="{0CDC862D-4A36-4110-A1D8-F0241D631B55}" type="datetimeFigureOut">
               <a:rPr lang="sv-SE" smtClean="0"/>
-              <a:t>2016-03-16</a:t>
+              <a:t>2016-03-23</a:t>
             </a:fld>
             <a:endParaRPr lang="sv-SE"/>
           </a:p>
@@ -2788,7 +2788,7 @@
           <a:p>
             <a:fld id="{0CDC862D-4A36-4110-A1D8-F0241D631B55}" type="datetimeFigureOut">
               <a:rPr lang="sv-SE" smtClean="0"/>
-              <a:t>2016-03-16</a:t>
+              <a:t>2016-03-23</a:t>
             </a:fld>
             <a:endParaRPr lang="sv-SE"/>
           </a:p>
@@ -3001,7 +3001,7 @@
           <a:p>
             <a:fld id="{0CDC862D-4A36-4110-A1D8-F0241D631B55}" type="datetimeFigureOut">
               <a:rPr lang="sv-SE" smtClean="0"/>
-              <a:t>2016-03-16</a:t>
+              <a:t>2016-03-23</a:t>
             </a:fld>
             <a:endParaRPr lang="sv-SE"/>
           </a:p>
@@ -3414,8 +3414,8 @@
         </p:nvSpPr>
         <p:spPr>
           <a:xfrm rot="5400000">
-            <a:off x="4008455" y="-1301787"/>
-            <a:ext cx="6899398" cy="9502976"/>
+            <a:off x="4029155" y="-1322487"/>
+            <a:ext cx="6857998" cy="9502976"/>
           </a:xfrm>
           <a:prstGeom prst="rect">
             <a:avLst/>
@@ -3464,7 +3464,7 @@
         </p:nvSpPr>
         <p:spPr>
           <a:xfrm>
-            <a:off x="17641" y="2154519"/>
+            <a:off x="0" y="2130285"/>
             <a:ext cx="12192000" cy="4744881"/>
           </a:xfrm>
           <a:prstGeom prst="rect">
@@ -4110,7 +4110,7 @@
         <p:spPr>
           <a:xfrm>
             <a:off x="9851745" y="2674284"/>
-            <a:ext cx="2305320" cy="2169825"/>
+            <a:ext cx="2305320" cy="2400657"/>
           </a:xfrm>
           <a:prstGeom prst="rect">
             <a:avLst/>
@@ -4191,15 +4191,35 @@
             </a:r>
           </a:p>
           <a:p>
+            <a:endParaRPr lang="sv-SE" sz="1500" dirty="0" smtClean="0">
+              <a:solidFill>
+                <a:schemeClr val="bg1"/>
+              </a:solidFill>
+              <a:latin typeface="Gill Sans MT" panose="020B0502020104020203" pitchFamily="34" charset="0"/>
+            </a:endParaRPr>
+          </a:p>
+          <a:p>
+            <a:r>
+              <a:rPr lang="sv-SE" sz="1500" dirty="0" smtClean="0">
+                <a:solidFill>
+                  <a:schemeClr val="bg1"/>
+                </a:solidFill>
+                <a:latin typeface="Gill Sans MT" panose="020B0502020104020203" pitchFamily="34" charset="0"/>
+              </a:rPr>
+              <a:t>Saldo</a:t>
+            </a:r>
+            <a:endParaRPr lang="sv-SE" sz="1500" dirty="0">
+              <a:solidFill>
+                <a:schemeClr val="bg1"/>
+              </a:solidFill>
+              <a:latin typeface="Gill Sans MT" panose="020B0502020104020203" pitchFamily="34" charset="0"/>
+            </a:endParaRPr>
+          </a:p>
+          <a:p>
             <a:endParaRPr lang="sv-SE" sz="1500" dirty="0">
               <a:latin typeface="Gill Sans MT" panose="020B0502020104020203" pitchFamily="34" charset="0"/>
             </a:endParaRPr>
           </a:p>
-          <a:p>
-            <a:endParaRPr lang="sv-SE" sz="1500" dirty="0">
-              <a:latin typeface="Gill Sans MT" panose="020B0502020104020203" pitchFamily="34" charset="0"/>
-            </a:endParaRPr>
-          </a:p>
         </p:txBody>
       </p:sp>
       <p:sp>
@@ -4211,7 +4231,7 @@
         <p:spPr>
           <a:xfrm>
             <a:off x="241181" y="2563140"/>
-            <a:ext cx="2571798" cy="1339767"/>
+            <a:ext cx="2571798" cy="1556486"/>
           </a:xfrm>
           <a:prstGeom prst="rect">
             <a:avLst/>
@@ -4258,8 +4278,8 @@
         </p:nvSpPr>
         <p:spPr>
           <a:xfrm>
-            <a:off x="6846325" y="4668825"/>
-            <a:ext cx="2571798" cy="1339767"/>
+            <a:off x="3637716" y="4666652"/>
+            <a:ext cx="2571798" cy="1540965"/>
           </a:xfrm>
           <a:prstGeom prst="rect">
             <a:avLst/>
@@ -4307,7 +4327,7 @@
         <p:spPr>
           <a:xfrm>
             <a:off x="267084" y="4666652"/>
-            <a:ext cx="2571798" cy="1339767"/>
+            <a:ext cx="2571798" cy="1540965"/>
           </a:xfrm>
           <a:prstGeom prst="rect">
             <a:avLst/>
@@ -4354,8 +4374,8 @@
         </p:nvSpPr>
         <p:spPr>
           <a:xfrm>
-            <a:off x="6846325" y="2566265"/>
-            <a:ext cx="2571798" cy="1339767"/>
+            <a:off x="3643310" y="2561937"/>
+            <a:ext cx="2571798" cy="1558891"/>
           </a:xfrm>
           <a:prstGeom prst="rect">
             <a:avLst/>
@@ -4402,7 +4422,7 @@
         </p:nvSpPr>
         <p:spPr>
           <a:xfrm rot="20774216">
-            <a:off x="1066411" y="3215869"/>
+            <a:off x="1066409" y="3484730"/>
             <a:ext cx="1719607" cy="434188"/>
           </a:xfrm>
           <a:prstGeom prst="roundRect">
@@ -4442,7 +4462,7 @@
         </p:nvSpPr>
         <p:spPr>
           <a:xfrm rot="20774216">
-            <a:off x="7671556" y="3241230"/>
+            <a:off x="4471766" y="5583691"/>
             <a:ext cx="1719607" cy="434188"/>
           </a:xfrm>
           <a:prstGeom prst="roundRect">
@@ -4482,7 +4502,7 @@
         </p:nvSpPr>
         <p:spPr>
           <a:xfrm rot="20774216">
-            <a:off x="7671555" y="5344742"/>
+            <a:off x="4477361" y="3401874"/>
             <a:ext cx="1719607" cy="434188"/>
           </a:xfrm>
           <a:prstGeom prst="roundRect">
@@ -4554,6 +4574,458 @@
           </a:p>
         </p:txBody>
       </p:sp>
+      <p:sp>
+        <p:nvSpPr>
+          <p:cNvPr id="29" name="Rektangel 28"/>
+          <p:cNvSpPr/>
+          <p:nvPr/>
+        </p:nvSpPr>
+        <p:spPr>
+          <a:xfrm>
+            <a:off x="6964258" y="4666652"/>
+            <a:ext cx="2571798" cy="1540965"/>
+          </a:xfrm>
+          <a:prstGeom prst="rect">
+            <a:avLst/>
+          </a:prstGeom>
+          <a:solidFill>
+            <a:schemeClr val="tx2">
+              <a:lumMod val="75000"/>
+            </a:schemeClr>
+          </a:solidFill>
+          <a:ln>
+            <a:noFill/>
+          </a:ln>
+        </p:spPr>
+        <p:style>
+          <a:lnRef idx="2">
+            <a:schemeClr val="accent1">
+              <a:shade val="50000"/>
+            </a:schemeClr>
+          </a:lnRef>
+          <a:fillRef idx="1">
+            <a:schemeClr val="accent1"/>
+          </a:fillRef>
+          <a:effectRef idx="0">
+            <a:schemeClr val="accent1"/>
+          </a:effectRef>
+          <a:fontRef idx="minor">
+            <a:schemeClr val="lt1"/>
+          </a:fontRef>
+        </p:style>
+        <p:txBody>
+          <a:bodyPr rtlCol="0" anchor="ctr"/>
+          <a:lstStyle/>
+          <a:p>
+            <a:pPr algn="ctr"/>
+            <a:endParaRPr lang="sv-SE"/>
+          </a:p>
+        </p:txBody>
+      </p:sp>
+      <p:sp>
+        <p:nvSpPr>
+          <p:cNvPr id="30" name="Rektangel 29"/>
+          <p:cNvSpPr/>
+          <p:nvPr/>
+        </p:nvSpPr>
+        <p:spPr>
+          <a:xfrm>
+            <a:off x="6964258" y="2563140"/>
+            <a:ext cx="2571798" cy="1556486"/>
+          </a:xfrm>
+          <a:prstGeom prst="rect">
+            <a:avLst/>
+          </a:prstGeom>
+          <a:solidFill>
+            <a:schemeClr val="tx2">
+              <a:lumMod val="75000"/>
+            </a:schemeClr>
+          </a:solidFill>
+          <a:ln>
+            <a:noFill/>
+          </a:ln>
+        </p:spPr>
+        <p:style>
+          <a:lnRef idx="2">
+            <a:schemeClr val="accent1">
+              <a:shade val="50000"/>
+            </a:schemeClr>
+          </a:lnRef>
+          <a:fillRef idx="1">
+            <a:schemeClr val="accent1"/>
+          </a:fillRef>
+          <a:effectRef idx="0">
+            <a:schemeClr val="accent1"/>
+          </a:effectRef>
+          <a:fontRef idx="minor">
+            <a:schemeClr val="lt1"/>
+          </a:fontRef>
+        </p:style>
+        <p:txBody>
+          <a:bodyPr rtlCol="0" anchor="ctr"/>
+          <a:lstStyle/>
+          <a:p>
+            <a:pPr algn="ctr"/>
+            <a:endParaRPr lang="sv-SE"/>
+          </a:p>
+        </p:txBody>
+      </p:sp>
+      <p:sp>
+        <p:nvSpPr>
+          <p:cNvPr id="31" name="Rektangel med rundade hörn 30"/>
+          <p:cNvSpPr/>
+          <p:nvPr/>
+        </p:nvSpPr>
+        <p:spPr>
+          <a:xfrm rot="20774216">
+            <a:off x="7781233" y="5273261"/>
+            <a:ext cx="1719607" cy="434188"/>
+          </a:xfrm>
+          <a:prstGeom prst="roundRect">
+            <a:avLst/>
+          </a:prstGeom>
+        </p:spPr>
+        <p:style>
+          <a:lnRef idx="2">
+            <a:schemeClr val="accent1">
+              <a:shade val="50000"/>
+            </a:schemeClr>
+          </a:lnRef>
+          <a:fillRef idx="1">
+            <a:schemeClr val="accent1"/>
+          </a:fillRef>
+          <a:effectRef idx="0">
+            <a:schemeClr val="accent1"/>
+          </a:effectRef>
+          <a:fontRef idx="minor">
+            <a:schemeClr val="lt1"/>
+          </a:fontRef>
+        </p:style>
+        <p:txBody>
+          <a:bodyPr rtlCol="0" anchor="ctr"/>
+          <a:lstStyle/>
+          <a:p>
+            <a:pPr algn="ctr"/>
+            <a:endParaRPr lang="sv-SE"/>
+          </a:p>
+        </p:txBody>
+      </p:sp>
+      <p:sp>
+        <p:nvSpPr>
+          <p:cNvPr id="32" name="Rektangel med rundade hörn 31"/>
+          <p:cNvSpPr/>
+          <p:nvPr/>
+        </p:nvSpPr>
+        <p:spPr>
+          <a:xfrm rot="20774216">
+            <a:off x="7789487" y="3484730"/>
+            <a:ext cx="1719607" cy="434188"/>
+          </a:xfrm>
+          <a:prstGeom prst="roundRect">
+            <a:avLst/>
+          </a:prstGeom>
+        </p:spPr>
+        <p:style>
+          <a:lnRef idx="2">
+            <a:schemeClr val="accent1">
+              <a:shade val="50000"/>
+            </a:schemeClr>
+          </a:lnRef>
+          <a:fillRef idx="1">
+            <a:schemeClr val="accent1"/>
+          </a:fillRef>
+          <a:effectRef idx="0">
+            <a:schemeClr val="accent1"/>
+          </a:effectRef>
+          <a:fontRef idx="minor">
+            <a:schemeClr val="lt1"/>
+          </a:fontRef>
+        </p:style>
+        <p:txBody>
+          <a:bodyPr rtlCol="0" anchor="ctr"/>
+          <a:lstStyle/>
+          <a:p>
+            <a:pPr algn="ctr"/>
+            <a:endParaRPr lang="sv-SE"/>
+          </a:p>
+        </p:txBody>
+      </p:sp>
+      <p:sp>
+        <p:nvSpPr>
+          <p:cNvPr id="10" name="Rektangel 9"/>
+          <p:cNvSpPr/>
+          <p:nvPr/>
+        </p:nvSpPr>
+        <p:spPr>
+          <a:xfrm>
+            <a:off x="2958110" y="588911"/>
+            <a:ext cx="2563700" cy="485107"/>
+          </a:xfrm>
+          <a:prstGeom prst="rect">
+            <a:avLst/>
+          </a:prstGeom>
+          <a:solidFill>
+            <a:schemeClr val="bg1">
+              <a:lumMod val="95000"/>
+            </a:schemeClr>
+          </a:solidFill>
+          <a:ln>
+            <a:noFill/>
+          </a:ln>
+        </p:spPr>
+        <p:style>
+          <a:lnRef idx="2">
+            <a:schemeClr val="accent1">
+              <a:shade val="50000"/>
+            </a:schemeClr>
+          </a:lnRef>
+          <a:fillRef idx="1">
+            <a:schemeClr val="accent1"/>
+          </a:fillRef>
+          <a:effectRef idx="0">
+            <a:schemeClr val="accent1"/>
+          </a:effectRef>
+          <a:fontRef idx="minor">
+            <a:schemeClr val="lt1"/>
+          </a:fontRef>
+        </p:style>
+        <p:txBody>
+          <a:bodyPr rtlCol="0" anchor="ctr"/>
+          <a:lstStyle/>
+          <a:p>
+            <a:pPr algn="ctr"/>
+            <a:endParaRPr lang="sv-SE"/>
+          </a:p>
+        </p:txBody>
+      </p:sp>
+      <p:sp>
+        <p:nvSpPr>
+          <p:cNvPr id="16" name="textruta 15"/>
+          <p:cNvSpPr txBox="1"/>
+          <p:nvPr/>
+        </p:nvSpPr>
+        <p:spPr>
+          <a:xfrm>
+            <a:off x="1143473" y="2714629"/>
+            <a:ext cx="853239" cy="369332"/>
+          </a:xfrm>
+          <a:prstGeom prst="rect">
+            <a:avLst/>
+          </a:prstGeom>
+          <a:noFill/>
+        </p:spPr>
+        <p:txBody>
+          <a:bodyPr wrap="square" rtlCol="0">
+            <a:spAutoFit/>
+          </a:bodyPr>
+          <a:lstStyle/>
+          <a:p>
+            <a:r>
+              <a:rPr lang="sv-SE" dirty="0" smtClean="0">
+                <a:solidFill>
+                  <a:schemeClr val="bg1"/>
+                </a:solidFill>
+              </a:rPr>
+              <a:t>Cancer</a:t>
+            </a:r>
+            <a:endParaRPr lang="sv-SE" dirty="0">
+              <a:solidFill>
+                <a:schemeClr val="bg1"/>
+              </a:solidFill>
+            </a:endParaRPr>
+          </a:p>
+        </p:txBody>
+      </p:sp>
+      <p:sp>
+        <p:nvSpPr>
+          <p:cNvPr id="17" name="textruta 16"/>
+          <p:cNvSpPr txBox="1"/>
+          <p:nvPr/>
+        </p:nvSpPr>
+        <p:spPr>
+          <a:xfrm>
+            <a:off x="4187087" y="2762637"/>
+            <a:ext cx="1695148" cy="369332"/>
+          </a:xfrm>
+          <a:prstGeom prst="rect">
+            <a:avLst/>
+          </a:prstGeom>
+          <a:noFill/>
+        </p:spPr>
+        <p:txBody>
+          <a:bodyPr wrap="square" rtlCol="0">
+            <a:spAutoFit/>
+          </a:bodyPr>
+          <a:lstStyle/>
+          <a:p>
+            <a:r>
+              <a:rPr lang="sv-SE" dirty="0" smtClean="0">
+                <a:solidFill>
+                  <a:schemeClr val="bg1"/>
+                </a:solidFill>
+              </a:rPr>
+              <a:t>Hiv/Aids</a:t>
+            </a:r>
+            <a:endParaRPr lang="sv-SE" dirty="0">
+              <a:solidFill>
+                <a:schemeClr val="bg1"/>
+              </a:solidFill>
+            </a:endParaRPr>
+          </a:p>
+        </p:txBody>
+      </p:sp>
+      <p:sp>
+        <p:nvSpPr>
+          <p:cNvPr id="18" name="textruta 17"/>
+          <p:cNvSpPr txBox="1"/>
+          <p:nvPr/>
+        </p:nvSpPr>
+        <p:spPr>
+          <a:xfrm>
+            <a:off x="7431715" y="2698079"/>
+            <a:ext cx="1581880" cy="369332"/>
+          </a:xfrm>
+          <a:prstGeom prst="rect">
+            <a:avLst/>
+          </a:prstGeom>
+          <a:noFill/>
+        </p:spPr>
+        <p:txBody>
+          <a:bodyPr wrap="square" rtlCol="0">
+            <a:spAutoFit/>
+          </a:bodyPr>
+          <a:lstStyle/>
+          <a:p>
+            <a:r>
+              <a:rPr lang="sv-SE" dirty="0" smtClean="0">
+                <a:solidFill>
+                  <a:schemeClr val="bg1"/>
+                </a:solidFill>
+              </a:rPr>
+              <a:t>Klamydia</a:t>
+            </a:r>
+            <a:endParaRPr lang="sv-SE" dirty="0">
+              <a:solidFill>
+                <a:schemeClr val="bg1"/>
+              </a:solidFill>
+            </a:endParaRPr>
+          </a:p>
+        </p:txBody>
+      </p:sp>
+      <p:sp>
+        <p:nvSpPr>
+          <p:cNvPr id="19" name="textruta 18"/>
+          <p:cNvSpPr txBox="1"/>
+          <p:nvPr/>
+        </p:nvSpPr>
+        <p:spPr>
+          <a:xfrm>
+            <a:off x="777221" y="4777732"/>
+            <a:ext cx="1632272" cy="369332"/>
+          </a:xfrm>
+          <a:prstGeom prst="rect">
+            <a:avLst/>
+          </a:prstGeom>
+          <a:noFill/>
+        </p:spPr>
+        <p:txBody>
+          <a:bodyPr wrap="square" rtlCol="0">
+            <a:spAutoFit/>
+          </a:bodyPr>
+          <a:lstStyle/>
+          <a:p>
+            <a:r>
+              <a:rPr lang="sv-SE" dirty="0" smtClean="0">
+                <a:solidFill>
+                  <a:schemeClr val="bg1"/>
+                </a:solidFill>
+              </a:rPr>
+              <a:t>Digerdöden</a:t>
+            </a:r>
+            <a:endParaRPr lang="sv-SE" dirty="0">
+              <a:solidFill>
+                <a:schemeClr val="bg1"/>
+              </a:solidFill>
+            </a:endParaRPr>
+          </a:p>
+        </p:txBody>
+      </p:sp>
+      <p:sp>
+        <p:nvSpPr>
+          <p:cNvPr id="20" name="textruta 19"/>
+          <p:cNvSpPr txBox="1"/>
+          <p:nvPr/>
+        </p:nvSpPr>
+        <p:spPr>
+          <a:xfrm>
+            <a:off x="4037428" y="4777732"/>
+            <a:ext cx="1545408" cy="369332"/>
+          </a:xfrm>
+          <a:prstGeom prst="rect">
+            <a:avLst/>
+          </a:prstGeom>
+          <a:noFill/>
+        </p:spPr>
+        <p:txBody>
+          <a:bodyPr wrap="square" rtlCol="0">
+            <a:spAutoFit/>
+          </a:bodyPr>
+          <a:lstStyle/>
+          <a:p>
+            <a:r>
+              <a:rPr lang="sv-SE" dirty="0" smtClean="0">
+                <a:solidFill>
+                  <a:schemeClr val="bg1"/>
+                </a:solidFill>
+              </a:rPr>
+              <a:t>Herpes</a:t>
+            </a:r>
+            <a:endParaRPr lang="sv-SE" dirty="0">
+              <a:solidFill>
+                <a:schemeClr val="bg1"/>
+              </a:solidFill>
+            </a:endParaRPr>
+          </a:p>
+        </p:txBody>
+      </p:sp>
+      <p:sp>
+        <p:nvSpPr>
+          <p:cNvPr id="21" name="textruta 20"/>
+          <p:cNvSpPr txBox="1"/>
+          <p:nvPr/>
+        </p:nvSpPr>
+        <p:spPr>
+          <a:xfrm>
+            <a:off x="7174271" y="4777732"/>
+            <a:ext cx="2230460" cy="369332"/>
+          </a:xfrm>
+          <a:prstGeom prst="rect">
+            <a:avLst/>
+          </a:prstGeom>
+          <a:noFill/>
+        </p:spPr>
+        <p:txBody>
+          <a:bodyPr wrap="square" rtlCol="0">
+            <a:spAutoFit/>
+          </a:bodyPr>
+          <a:lstStyle/>
+          <a:p>
+            <a:r>
+              <a:rPr lang="sv-SE" dirty="0">
+                <a:solidFill>
+                  <a:schemeClr val="bg1"/>
+                </a:solidFill>
+              </a:rPr>
+              <a:t>Kyasanur Forest Virus</a:t>
+            </a:r>
+            <a:endParaRPr lang="sv-SE" dirty="0">
+              <a:solidFill>
+                <a:schemeClr val="bg1"/>
+              </a:solidFill>
+            </a:endParaRPr>
+          </a:p>
+        </p:txBody>
+      </p:sp>
     </p:spTree>
     <p:extLst>
       <p:ext uri="{BB962C8B-B14F-4D97-AF65-F5344CB8AC3E}">
@@ -4564,6 +5036,13 @@
   <p:clrMapOvr>
     <a:masterClrMapping/>
   </p:clrMapOvr>
+  <p:timing>
+    <p:tnLst>
+      <p:par>
+        <p:cTn id="1" dur="indefinite" restart="never" nodeType="tmRoot"/>
+      </p:par>
+    </p:tnLst>
+  </p:timing>
 </p:sld>
 </file>
 

</xml_diff>